<commit_message>
apresentacao att correcao bd
</commit_message>
<xml_diff>
--- a/Apresentação - Prepta.pptx
+++ b/Apresentação - Prepta.pptx
@@ -9160,42 +9160,6 @@
           </a:p>
         </p:txBody>
       </p:sp>
-      <p:pic>
-        <p:nvPicPr>
-          <p:cNvPr id="4" name="Picture 3" descr="Diagram&#10;&#10;Description automatically generated">
-            <a:extLst>
-              <a:ext uri="{FF2B5EF4-FFF2-40B4-BE49-F238E27FC236}">
-                <a16:creationId xmlns:a16="http://schemas.microsoft.com/office/drawing/2014/main" id="{159C7AE3-CD37-4F46-A51D-23A7814A8959}"/>
-              </a:ext>
-            </a:extLst>
-          </p:cNvPr>
-          <p:cNvPicPr>
-            <a:picLocks noChangeAspect="1"/>
-          </p:cNvPicPr>
-          <p:nvPr/>
-        </p:nvPicPr>
-        <p:blipFill>
-          <a:blip r:embed="rId2">
-            <a:extLst>
-              <a:ext uri="{28A0092B-C50C-407E-A947-70E740481C1C}">
-                <a14:useLocalDpi xmlns:a14="http://schemas.microsoft.com/office/drawing/2010/main" val="0"/>
-              </a:ext>
-            </a:extLst>
-          </a:blip>
-          <a:stretch>
-            <a:fillRect/>
-          </a:stretch>
-        </p:blipFill>
-        <p:spPr>
-          <a:xfrm>
-            <a:off x="2832100" y="695203"/>
-            <a:ext cx="6901251" cy="5797672"/>
-          </a:xfrm>
-          <a:prstGeom prst="rect">
-            <a:avLst/>
-          </a:prstGeom>
-        </p:spPr>
-      </p:pic>
       <p:sp>
         <p:nvSpPr>
           <p:cNvPr id="5" name="Title 1">
@@ -9274,6 +9238,42 @@
           </a:fontRef>
         </p:style>
       </p:cxnSp>
+      <p:pic>
+        <p:nvPicPr>
+          <p:cNvPr id="3" name="Picture 2" descr="Diagram&#10;&#10;Description automatically generated">
+            <a:extLst>
+              <a:ext uri="{FF2B5EF4-FFF2-40B4-BE49-F238E27FC236}">
+                <a16:creationId xmlns:a16="http://schemas.microsoft.com/office/drawing/2014/main" id="{4C4AE76D-744A-4571-AC2B-0F6C14829994}"/>
+              </a:ext>
+            </a:extLst>
+          </p:cNvPr>
+          <p:cNvPicPr>
+            <a:picLocks noChangeAspect="1"/>
+          </p:cNvPicPr>
+          <p:nvPr/>
+        </p:nvPicPr>
+        <p:blipFill>
+          <a:blip r:embed="rId2">
+            <a:extLst>
+              <a:ext uri="{28A0092B-C50C-407E-A947-70E740481C1C}">
+                <a14:useLocalDpi xmlns:a14="http://schemas.microsoft.com/office/drawing/2010/main" val="0"/>
+              </a:ext>
+            </a:extLst>
+          </a:blip>
+          <a:stretch>
+            <a:fillRect/>
+          </a:stretch>
+        </p:blipFill>
+        <p:spPr>
+          <a:xfrm>
+            <a:off x="2470069" y="965263"/>
+            <a:ext cx="6708684" cy="5527612"/>
+          </a:xfrm>
+          <a:prstGeom prst="rect">
+            <a:avLst/>
+          </a:prstGeom>
+        </p:spPr>
+      </p:pic>
     </p:spTree>
     <p:extLst>
       <p:ext uri="{BB962C8B-B14F-4D97-AF65-F5344CB8AC3E}">

</xml_diff>